<commit_message>
Them tt chuong sach TA
</commit_message>
<xml_diff>
--- a/Bai 10 Nén chi muc nguoc.pptx
+++ b/Bai 10 Nén chi muc nguoc.pptx
@@ -168,7 +168,7 @@
   </p:defaultTextStyle>
   <p:extLst>
     <p:ext uri="{EFAFB233-063F-42B5-8137-9DF3F51BA10A}">
-      <p15:sldGuideLst xmlns="" xmlns:p15="http://schemas.microsoft.com/office/powerpoint/2012/main">
+      <p15:sldGuideLst xmlns:p15="http://schemas.microsoft.com/office/powerpoint/2012/main" xmlns="">
         <p15:guide id="1" orient="horz" pos="2160">
           <p15:clr>
             <a:srgbClr val="A4A3A4"/>
@@ -6111,10 +6111,27 @@
           <a:bodyPr/>
           <a:lstStyle/>
           <a:p>
+            <a:pPr algn="just"/>
             <a:r>
               <a:rPr lang="vi-VN" dirty="0" smtClean="0"/>
-              <a:t>Chương 8. Nén chỉ mục ngược</a:t>
-            </a:r>
+              <a:t>Chương 8. Nén chỉ </a:t>
+            </a:r>
+            <a:r>
+              <a:rPr lang="vi-VN" smtClean="0"/>
+              <a:t>mục </a:t>
+            </a:r>
+            <a:r>
+              <a:rPr lang="vi-VN" smtClean="0"/>
+              <a:t>ngược</a:t>
+            </a:r>
+          </a:p>
+          <a:p>
+            <a:pPr algn="just"/>
+            <a:r>
+              <a:rPr lang="vi-VN" smtClean="0"/>
+              <a:t>IIR.C5. Index Compression</a:t>
+            </a:r>
+            <a:endParaRPr lang="vi-VN" dirty="0" smtClean="0"/>
           </a:p>
           <a:p>
             <a:pPr algn="r"/>
@@ -6582,7 +6599,7 @@
           <a:graphicData uri="http://schemas.openxmlformats.org/presentationml/2006/ole">
             <mc:AlternateContent xmlns:mc="http://schemas.openxmlformats.org/markup-compatibility/2006">
               <mc:Choice xmlns:v="urn:schemas-microsoft-com:vml" Requires="v">
-                <p:oleObj spid="_x0000_s562462" name="Document" r:id="rId3" imgW="6562100" imgH="4119372" progId="Word.Document.8">
+                <p:oleObj spid="_x0000_s562464" name="Document" r:id="rId3" imgW="6562100" imgH="4119372" progId="Word.Document.8">
                   <p:embed/>
                 </p:oleObj>
               </mc:Choice>
@@ -8357,7 +8374,7 @@
           <a:graphicData uri="http://schemas.openxmlformats.org/presentationml/2006/ole">
             <mc:AlternateContent xmlns:mc="http://schemas.openxmlformats.org/markup-compatibility/2006">
               <mc:Choice xmlns:v="urn:schemas-microsoft-com:vml" Requires="v">
-                <p:oleObj spid="_x0000_s564508" name="Документ" r:id="rId3" imgW="6404760" imgH="3941280" progId="Word.Document.8">
+                <p:oleObj spid="_x0000_s564510" name="Документ" r:id="rId3" imgW="6404760" imgH="3941280" progId="Word.Document.8">
                   <p:embed/>
                 </p:oleObj>
               </mc:Choice>
@@ -9201,10 +9218,6 @@
               </a:rPr>
               <a:t>L là độ dài chuỗi</a:t>
             </a:r>
-            <a:endParaRPr lang="vi-VN" sz="2000" dirty="0" smtClean="0">
-              <a:ea typeface="Arial Unicode MS" panose="020B0604020202020204" pitchFamily="34" charset="-128"/>
-              <a:cs typeface="Arial Unicode MS" panose="020B0604020202020204" pitchFamily="34" charset="-128"/>
-            </a:endParaRPr>
           </a:p>
         </p:txBody>
       </p:sp>
@@ -9764,7 +9777,7 @@
           <a:graphicData uri="http://schemas.openxmlformats.org/presentationml/2006/ole">
             <mc:AlternateContent xmlns:mc="http://schemas.openxmlformats.org/markup-compatibility/2006">
               <mc:Choice xmlns:v="urn:schemas-microsoft-com:vml" Requires="v">
-                <p:oleObj spid="_x0000_s566549" name="Document" r:id="rId3" imgW="6599520" imgH="4689000" progId="Word.Document.8">
+                <p:oleObj spid="_x0000_s566551" name="Document" r:id="rId3" imgW="6599520" imgH="4689000" progId="Word.Document.8">
                   <p:embed/>
                 </p:oleObj>
               </mc:Choice>
@@ -12398,7 +12411,6 @@
               <a:rPr lang="vi-VN" dirty="0" smtClean="0"/>
               <a:t>Ví dụ, mô hình Boolean.</a:t>
             </a:r>
-            <a:endParaRPr lang="vi-VN" dirty="0" smtClean="0"/>
           </a:p>
           <a:p>
             <a:pPr algn="just"/>
@@ -27574,7 +27586,6 @@
               <a:rPr lang="vi-VN" dirty="0" smtClean="0"/>
               <a:t>Hãy xác định danh sách mã văn bản ban đầu.</a:t>
             </a:r>
-            <a:endParaRPr lang="vi-VN" dirty="0" smtClean="0"/>
           </a:p>
         </p:txBody>
       </p:sp>
@@ -28431,7 +28442,7 @@
           <a:graphicData uri="http://schemas.openxmlformats.org/presentationml/2006/ole">
             <mc:AlternateContent xmlns:mc="http://schemas.openxmlformats.org/markup-compatibility/2006">
               <mc:Choice xmlns:v="urn:schemas-microsoft-com:vml" Requires="v">
-                <p:oleObj spid="_x0000_s606927" name="Equation" r:id="rId3" imgW="799920" imgH="253800" progId="Equation.3">
+                <p:oleObj spid="_x0000_s606933" name="Equation" r:id="rId3" imgW="799920" imgH="253800" progId="Equation.3">
                   <p:embed/>
                 </p:oleObj>
               </mc:Choice>
@@ -28524,7 +28535,7 @@
           <a:graphicData uri="http://schemas.openxmlformats.org/presentationml/2006/ole">
             <mc:AlternateContent xmlns:mc="http://schemas.openxmlformats.org/markup-compatibility/2006">
               <mc:Choice xmlns:v="urn:schemas-microsoft-com:vml" Requires="v">
-                <p:oleObj spid="_x0000_s606928" name="Equation" r:id="rId5" imgW="939600" imgH="419040" progId="Equation.3">
+                <p:oleObj spid="_x0000_s606934" name="Equation" r:id="rId5" imgW="939600" imgH="419040" progId="Equation.3">
                   <p:embed/>
                 </p:oleObj>
               </mc:Choice>
@@ -28617,7 +28628,7 @@
           <a:graphicData uri="http://schemas.openxmlformats.org/presentationml/2006/ole">
             <mc:AlternateContent xmlns:mc="http://schemas.openxmlformats.org/markup-compatibility/2006">
               <mc:Choice xmlns:v="urn:schemas-microsoft-com:vml" Requires="v">
-                <p:oleObj spid="_x0000_s606929" name="Equation" r:id="rId7" imgW="1574640" imgH="533160" progId="Equation.3">
+                <p:oleObj spid="_x0000_s606935" name="Equation" r:id="rId7" imgW="1574640" imgH="533160" progId="Equation.3">
                   <p:embed/>
                 </p:oleObj>
               </mc:Choice>
@@ -29619,7 +29630,6 @@
               <a:rPr lang="vi-VN" dirty="0" smtClean="0"/>
               <a:t>Có thể coi các phép lọc trong quá trình tách từ (chuẩn hóa cách viết, loại từ dừng, v.v.) là những phương pháp nén không bảo toàn.</a:t>
             </a:r>
-            <a:endParaRPr lang="vi-VN" dirty="0" smtClean="0"/>
           </a:p>
         </p:txBody>
       </p:sp>
@@ -30385,7 +30395,7 @@
   </a:extraClrSchemeLst>
   <a:extLst>
     <a:ext uri="{05A4C25C-085E-4340-85A3-A5531E510DB2}">
-      <thm15:themeFamily xmlns="" xmlns:thm15="http://schemas.microsoft.com/office/thememl/2012/main" name="Office Theme" id="{62F939B6-93AF-4DB8-9C6B-D6C7DFDC589F}" vid="{4A3C46E8-61CC-4603-A589-7422A47A8E4A}"/>
+      <thm15:themeFamily xmlns:thm15="http://schemas.microsoft.com/office/thememl/2012/main" xmlns="" name="Office Theme" id="{62F939B6-93AF-4DB8-9C6B-D6C7DFDC589F}" vid="{4A3C46E8-61CC-4603-A589-7422A47A8E4A}"/>
     </a:ext>
   </a:extLst>
 </a:theme>
@@ -30646,7 +30656,7 @@
   <a:extraClrSchemeLst/>
   <a:extLst>
     <a:ext uri="{05A4C25C-085E-4340-85A3-A5531E510DB2}">
-      <thm15:themeFamily xmlns="" xmlns:thm15="http://schemas.microsoft.com/office/thememl/2012/main" name="Office Theme" id="{62F939B6-93AF-4DB8-9C6B-D6C7DFDC589F}" vid="{4A3C46E8-61CC-4603-A589-7422A47A8E4A}"/>
+      <thm15:themeFamily xmlns:thm15="http://schemas.microsoft.com/office/thememl/2012/main" xmlns="" name="Office Theme" id="{62F939B6-93AF-4DB8-9C6B-D6C7DFDC589F}" vid="{4A3C46E8-61CC-4603-A589-7422A47A8E4A}"/>
     </a:ext>
   </a:extLst>
 </a:theme>

</xml_diff>

<commit_message>
Điều chỉnh tên bài và tên tệp
</commit_message>
<xml_diff>
--- a/Bai 10 Nén chi muc nguoc.pptx
+++ b/Bai 10 Nén chi muc nguoc.pptx
@@ -6103,8 +6103,8 @@
         </p:nvSpPr>
         <p:spPr>
           <a:xfrm>
-            <a:off x="1371600" y="3501008"/>
-            <a:ext cx="6872808" cy="2137792"/>
+            <a:off x="611560" y="3429000"/>
+            <a:ext cx="8208912" cy="2209800"/>
           </a:xfrm>
         </p:spPr>
         <p:txBody>
@@ -6113,16 +6113,20 @@
           <a:p>
             <a:pPr algn="just"/>
             <a:r>
+              <a:rPr lang="vi-VN" smtClean="0"/>
+              <a:t>Bài </a:t>
+            </a:r>
+            <a:r>
+              <a:rPr lang="vi-VN" smtClean="0"/>
+              <a:t>10. </a:t>
+            </a:r>
+            <a:r>
               <a:rPr lang="vi-VN" dirty="0" smtClean="0"/>
-              <a:t>Chương 8. Nén chỉ </a:t>
+              <a:t>Nén chỉ </a:t>
             </a:r>
             <a:r>
               <a:rPr lang="vi-VN" smtClean="0"/>
-              <a:t>mục </a:t>
-            </a:r>
-            <a:r>
-              <a:rPr lang="vi-VN" smtClean="0"/>
-              <a:t>ngược</a:t>
+              <a:t>mục ngược</a:t>
             </a:r>
           </a:p>
           <a:p>
@@ -6599,12 +6603,12 @@
           <a:graphicData uri="http://schemas.openxmlformats.org/presentationml/2006/ole">
             <mc:AlternateContent xmlns:mc="http://schemas.openxmlformats.org/markup-compatibility/2006">
               <mc:Choice xmlns:v="urn:schemas-microsoft-com:vml" Requires="v">
-                <p:oleObj spid="_x0000_s562464" name="Document" r:id="rId3" imgW="6562100" imgH="4119372" progId="Word.Document.8">
+                <p:oleObj spid="_x0000_s562467" name="Document" r:id="rId4" imgW="6562100" imgH="4119372" progId="Word.Document.8">
                   <p:embed/>
                 </p:oleObj>
               </mc:Choice>
               <mc:Fallback>
-                <p:oleObj name="Document" r:id="rId3" imgW="6562100" imgH="4119372" progId="Word.Document.8">
+                <p:oleObj name="Document" r:id="rId4" imgW="6562100" imgH="4119372" progId="Word.Document.8">
                   <p:embed/>
                   <p:pic>
                     <p:nvPicPr>
@@ -6615,7 +6619,7 @@
                       <p:nvPr/>
                     </p:nvPicPr>
                     <p:blipFill>
-                      <a:blip r:embed="rId4"/>
+                      <a:blip r:embed="rId5"/>
                       <a:srcRect/>
                       <a:stretch>
                         <a:fillRect/>
@@ -8374,7 +8378,7 @@
           <a:graphicData uri="http://schemas.openxmlformats.org/presentationml/2006/ole">
             <mc:AlternateContent xmlns:mc="http://schemas.openxmlformats.org/markup-compatibility/2006">
               <mc:Choice xmlns:v="urn:schemas-microsoft-com:vml" Requires="v">
-                <p:oleObj spid="_x0000_s564510" name="Документ" r:id="rId3" imgW="6404760" imgH="3941280" progId="Word.Document.8">
+                <p:oleObj spid="_x0000_s564513" name="Документ" r:id="rId3" imgW="6404760" imgH="3941280" progId="Word.Document.8">
                   <p:embed/>
                 </p:oleObj>
               </mc:Choice>
@@ -9777,7 +9781,7 @@
           <a:graphicData uri="http://schemas.openxmlformats.org/presentationml/2006/ole">
             <mc:AlternateContent xmlns:mc="http://schemas.openxmlformats.org/markup-compatibility/2006">
               <mc:Choice xmlns:v="urn:schemas-microsoft-com:vml" Requires="v">
-                <p:oleObj spid="_x0000_s566551" name="Document" r:id="rId3" imgW="6599520" imgH="4689000" progId="Word.Document.8">
+                <p:oleObj spid="_x0000_s566554" name="Document" r:id="rId3" imgW="6599520" imgH="4689000" progId="Word.Document.8">
                   <p:embed/>
                 </p:oleObj>
               </mc:Choice>
@@ -28442,7 +28446,7 @@
           <a:graphicData uri="http://schemas.openxmlformats.org/presentationml/2006/ole">
             <mc:AlternateContent xmlns:mc="http://schemas.openxmlformats.org/markup-compatibility/2006">
               <mc:Choice xmlns:v="urn:schemas-microsoft-com:vml" Requires="v">
-                <p:oleObj spid="_x0000_s606933" name="Equation" r:id="rId3" imgW="799920" imgH="253800" progId="Equation.3">
+                <p:oleObj spid="_x0000_s606942" name="Equation" r:id="rId3" imgW="799920" imgH="253800" progId="Equation.3">
                   <p:embed/>
                 </p:oleObj>
               </mc:Choice>
@@ -28535,7 +28539,7 @@
           <a:graphicData uri="http://schemas.openxmlformats.org/presentationml/2006/ole">
             <mc:AlternateContent xmlns:mc="http://schemas.openxmlformats.org/markup-compatibility/2006">
               <mc:Choice xmlns:v="urn:schemas-microsoft-com:vml" Requires="v">
-                <p:oleObj spid="_x0000_s606934" name="Equation" r:id="rId5" imgW="939600" imgH="419040" progId="Equation.3">
+                <p:oleObj spid="_x0000_s606943" name="Equation" r:id="rId5" imgW="939600" imgH="419040" progId="Equation.3">
                   <p:embed/>
                 </p:oleObj>
               </mc:Choice>
@@ -28628,7 +28632,7 @@
           <a:graphicData uri="http://schemas.openxmlformats.org/presentationml/2006/ole">
             <mc:AlternateContent xmlns:mc="http://schemas.openxmlformats.org/markup-compatibility/2006">
               <mc:Choice xmlns:v="urn:schemas-microsoft-com:vml" Requires="v">
-                <p:oleObj spid="_x0000_s606935" name="Equation" r:id="rId7" imgW="1574640" imgH="533160" progId="Equation.3">
+                <p:oleObj spid="_x0000_s606944" name="Equation" r:id="rId7" imgW="1574640" imgH="533160" progId="Equation.3">
                   <p:embed/>
                 </p:oleObj>
               </mc:Choice>

</xml_diff>